<commit_message>
fix menu.cpp and game.cpp
</commit_message>
<xml_diff>
--- a/docs/Math Solvers.pptx
+++ b/docs/Math Solvers.pptx
@@ -267,7 +267,7 @@
           <a:p>
             <a:fld id="{A0CB4A69-CDFD-438F-892F-50E28215116C}" type="datetimeFigureOut">
               <a:rPr lang="bg-BG" smtClean="0"/>
-              <a:t>25.3.2023 г.</a:t>
+              <a:t>26.3.2023 г.</a:t>
             </a:fld>
             <a:endParaRPr lang="bg-BG"/>
           </a:p>
@@ -467,7 +467,7 @@
           <a:p>
             <a:fld id="{A0CB4A69-CDFD-438F-892F-50E28215116C}" type="datetimeFigureOut">
               <a:rPr lang="bg-BG" smtClean="0"/>
-              <a:t>25.3.2023 г.</a:t>
+              <a:t>26.3.2023 г.</a:t>
             </a:fld>
             <a:endParaRPr lang="bg-BG"/>
           </a:p>
@@ -677,7 +677,7 @@
           <a:p>
             <a:fld id="{A0CB4A69-CDFD-438F-892F-50E28215116C}" type="datetimeFigureOut">
               <a:rPr lang="bg-BG" smtClean="0"/>
-              <a:t>25.3.2023 г.</a:t>
+              <a:t>26.3.2023 г.</a:t>
             </a:fld>
             <a:endParaRPr lang="bg-BG"/>
           </a:p>
@@ -877,7 +877,7 @@
           <a:p>
             <a:fld id="{A0CB4A69-CDFD-438F-892F-50E28215116C}" type="datetimeFigureOut">
               <a:rPr lang="bg-BG" smtClean="0"/>
-              <a:t>25.3.2023 г.</a:t>
+              <a:t>26.3.2023 г.</a:t>
             </a:fld>
             <a:endParaRPr lang="bg-BG"/>
           </a:p>
@@ -1153,7 +1153,7 @@
           <a:p>
             <a:fld id="{A0CB4A69-CDFD-438F-892F-50E28215116C}" type="datetimeFigureOut">
               <a:rPr lang="bg-BG" smtClean="0"/>
-              <a:t>25.3.2023 г.</a:t>
+              <a:t>26.3.2023 г.</a:t>
             </a:fld>
             <a:endParaRPr lang="bg-BG"/>
           </a:p>
@@ -1421,7 +1421,7 @@
           <a:p>
             <a:fld id="{A0CB4A69-CDFD-438F-892F-50E28215116C}" type="datetimeFigureOut">
               <a:rPr lang="bg-BG" smtClean="0"/>
-              <a:t>25.3.2023 г.</a:t>
+              <a:t>26.3.2023 г.</a:t>
             </a:fld>
             <a:endParaRPr lang="bg-BG"/>
           </a:p>
@@ -1836,7 +1836,7 @@
           <a:p>
             <a:fld id="{A0CB4A69-CDFD-438F-892F-50E28215116C}" type="datetimeFigureOut">
               <a:rPr lang="bg-BG" smtClean="0"/>
-              <a:t>25.3.2023 г.</a:t>
+              <a:t>26.3.2023 г.</a:t>
             </a:fld>
             <a:endParaRPr lang="bg-BG"/>
           </a:p>
@@ -1978,7 +1978,7 @@
           <a:p>
             <a:fld id="{A0CB4A69-CDFD-438F-892F-50E28215116C}" type="datetimeFigureOut">
               <a:rPr lang="bg-BG" smtClean="0"/>
-              <a:t>25.3.2023 г.</a:t>
+              <a:t>26.3.2023 г.</a:t>
             </a:fld>
             <a:endParaRPr lang="bg-BG"/>
           </a:p>
@@ -2091,7 +2091,7 @@
           <a:p>
             <a:fld id="{A0CB4A69-CDFD-438F-892F-50E28215116C}" type="datetimeFigureOut">
               <a:rPr lang="bg-BG" smtClean="0"/>
-              <a:t>25.3.2023 г.</a:t>
+              <a:t>26.3.2023 г.</a:t>
             </a:fld>
             <a:endParaRPr lang="bg-BG"/>
           </a:p>
@@ -2404,7 +2404,7 @@
           <a:p>
             <a:fld id="{A0CB4A69-CDFD-438F-892F-50E28215116C}" type="datetimeFigureOut">
               <a:rPr lang="bg-BG" smtClean="0"/>
-              <a:t>25.3.2023 г.</a:t>
+              <a:t>26.3.2023 г.</a:t>
             </a:fld>
             <a:endParaRPr lang="bg-BG"/>
           </a:p>
@@ -2693,7 +2693,7 @@
           <a:p>
             <a:fld id="{A0CB4A69-CDFD-438F-892F-50E28215116C}" type="datetimeFigureOut">
               <a:rPr lang="bg-BG" smtClean="0"/>
-              <a:t>25.3.2023 г.</a:t>
+              <a:t>26.3.2023 г.</a:t>
             </a:fld>
             <a:endParaRPr lang="bg-BG"/>
           </a:p>
@@ -2936,7 +2936,7 @@
           <a:p>
             <a:fld id="{A0CB4A69-CDFD-438F-892F-50E28215116C}" type="datetimeFigureOut">
               <a:rPr lang="bg-BG" smtClean="0"/>
-              <a:t>25.3.2023 г.</a:t>
+              <a:t>26.3.2023 г.</a:t>
             </a:fld>
             <a:endParaRPr lang="bg-BG"/>
           </a:p>
@@ -3380,7 +3380,7 @@
           <a:lstStyle/>
           <a:p>
             <a:r>
-              <a:rPr lang="en-US" dirty="0" smtClean="0">
+              <a:rPr lang="en-US" dirty="0">
                 <a:latin typeface="Sylfaen" panose="010A0502050306030303" pitchFamily="18" charset="0"/>
                 <a:ea typeface="Yu Gothic Light" panose="020B0300000000000000" pitchFamily="34" charset="-128"/>
               </a:rPr>
@@ -3451,7 +3451,7 @@
           <a:p>
             <a:pPr algn="ctr"/>
             <a:r>
-              <a:rPr lang="en-US" dirty="0" smtClean="0">
+              <a:rPr lang="en-US" dirty="0">
                 <a:latin typeface="Sylfaen" panose="010A0502050306030303" pitchFamily="18" charset="0"/>
                 <a:ea typeface="Yu Gothic Light" panose="020B0300000000000000" pitchFamily="34" charset="-128"/>
               </a:rPr>
@@ -3524,14 +3524,11 @@
           <a:p>
             <a:pPr algn="ctr"/>
             <a:r>
-              <a:rPr lang="en-US" sz="2000" dirty="0" smtClean="0">
+              <a:rPr lang="en-US" sz="2000" dirty="0">
                 <a:ea typeface="Yu Gothic Light" panose="020B0300000000000000" pitchFamily="34" charset="-128"/>
               </a:rPr>
               <a:t>Ivan Tsvyatkov</a:t>
             </a:r>
-            <a:endParaRPr lang="en-US" sz="2000" dirty="0">
-              <a:ea typeface="Yu Gothic Light" panose="020B0300000000000000" pitchFamily="34" charset="-128"/>
-            </a:endParaRPr>
           </a:p>
           <a:p>
             <a:pPr algn="ctr"/>
@@ -3574,14 +3571,11 @@
           <a:p>
             <a:pPr algn="ctr"/>
             <a:r>
-              <a:rPr lang="en-US" sz="2000" dirty="0" smtClean="0">
+              <a:rPr lang="en-US" sz="2000" dirty="0">
                 <a:ea typeface="Yu Gothic Light" panose="020B0300000000000000" pitchFamily="34" charset="-128"/>
               </a:rPr>
               <a:t>Stiliyan Mishev</a:t>
             </a:r>
-            <a:endParaRPr lang="en-US" sz="2000" dirty="0">
-              <a:ea typeface="Yu Gothic Light" panose="020B0300000000000000" pitchFamily="34" charset="-128"/>
-            </a:endParaRPr>
           </a:p>
           <a:p>
             <a:pPr algn="ctr"/>
@@ -3618,16 +3612,15 @@
           <a:p>
             <a:pPr algn="ctr"/>
             <a:r>
-              <a:rPr lang="en-US" sz="2000" dirty="0" smtClean="0"/>
+              <a:rPr lang="en-US" sz="2000" dirty="0"/>
               <a:t>Dimitar Byandov</a:t>
             </a:r>
           </a:p>
           <a:p>
             <a:r>
-              <a:rPr lang="en-US" sz="2000" dirty="0" smtClean="0"/>
+              <a:rPr lang="en-US" sz="2000" dirty="0"/>
               <a:t>Frontend Developer &amp; Backend Developer</a:t>
             </a:r>
-            <a:endParaRPr lang="en-US" sz="2000" dirty="0"/>
           </a:p>
         </p:txBody>
       </p:sp>
@@ -3791,13 +3784,6 @@
   <p:clrMapOvr>
     <a:masterClrMapping/>
   </p:clrMapOvr>
-  <p:timing>
-    <p:tnLst>
-      <p:par>
-        <p:cTn id="1" dur="indefinite" restart="never" nodeType="tmRoot"/>
-      </p:par>
-    </p:tnLst>
-  </p:timing>
 </p:sld>
 </file>
 
@@ -3973,13 +3959,6 @@
   <p:clrMapOvr>
     <a:masterClrMapping/>
   </p:clrMapOvr>
-  <p:timing>
-    <p:tnLst>
-      <p:par>
-        <p:cTn id="1" dur="indefinite" restart="never" nodeType="tmRoot"/>
-      </p:par>
-    </p:tnLst>
-  </p:timing>
 </p:sld>
 </file>
 
@@ -4285,13 +4264,6 @@
   <p:clrMapOvr>
     <a:masterClrMapping/>
   </p:clrMapOvr>
-  <p:timing>
-    <p:tnLst>
-      <p:par>
-        <p:cTn id="1" dur="indefinite" restart="never" nodeType="tmRoot"/>
-      </p:par>
-    </p:tnLst>
-  </p:timing>
 </p:sld>
 </file>
 
@@ -4387,13 +4359,6 @@
   <p:clrMapOvr>
     <a:masterClrMapping/>
   </p:clrMapOvr>
-  <p:timing>
-    <p:tnLst>
-      <p:par>
-        <p:cTn id="1" dur="indefinite" restart="never" nodeType="tmRoot"/>
-      </p:par>
-    </p:tnLst>
-  </p:timing>
 </p:sld>
 </file>
 
@@ -4486,13 +4451,6 @@
   <p:clrMapOvr>
     <a:masterClrMapping/>
   </p:clrMapOvr>
-  <p:timing>
-    <p:tnLst>
-      <p:par>
-        <p:cTn id="1" dur="indefinite" restart="never" nodeType="tmRoot"/>
-      </p:par>
-    </p:tnLst>
-  </p:timing>
 </p:sld>
 </file>
 

</xml_diff>